<commit_message>
upgrading the build. Working on the auto upgrade runner sample
</commit_message>
<xml_diff>
--- a/branches/nhibernate/docs/RoundhousEPresentation.pptx
+++ b/branches/nhibernate/docs/RoundhousEPresentation.pptx
@@ -5,19 +5,25 @@
     <p:sldMasterId id="2147483660" r:id="rId1"/>
   </p:sldMasterIdLst>
   <p:notesMasterIdLst>
-    <p:notesMasterId r:id="rId12"/>
+    <p:notesMasterId r:id="rId18"/>
   </p:notesMasterIdLst>
   <p:sldIdLst>
     <p:sldId id="256" r:id="rId2"/>
-    <p:sldId id="302" r:id="rId3"/>
-    <p:sldId id="296" r:id="rId4"/>
-    <p:sldId id="295" r:id="rId5"/>
-    <p:sldId id="297" r:id="rId6"/>
-    <p:sldId id="298" r:id="rId7"/>
-    <p:sldId id="299" r:id="rId8"/>
-    <p:sldId id="300" r:id="rId9"/>
-    <p:sldId id="294" r:id="rId10"/>
-    <p:sldId id="289" r:id="rId11"/>
+    <p:sldId id="301" r:id="rId3"/>
+    <p:sldId id="298" r:id="rId4"/>
+    <p:sldId id="302" r:id="rId5"/>
+    <p:sldId id="295" r:id="rId6"/>
+    <p:sldId id="299" r:id="rId7"/>
+    <p:sldId id="300" r:id="rId8"/>
+    <p:sldId id="303" r:id="rId9"/>
+    <p:sldId id="304" r:id="rId10"/>
+    <p:sldId id="305" r:id="rId11"/>
+    <p:sldId id="307" r:id="rId12"/>
+    <p:sldId id="306" r:id="rId13"/>
+    <p:sldId id="308" r:id="rId14"/>
+    <p:sldId id="309" r:id="rId15"/>
+    <p:sldId id="294" r:id="rId16"/>
+    <p:sldId id="289" r:id="rId17"/>
   </p:sldIdLst>
   <p:sldSz cx="9144000" cy="6858000" type="screen4x3"/>
   <p:notesSz cx="6858000" cy="9144000"/>
@@ -202,7 +208,7 @@
             <a:fld id="{50B9556B-D0FD-4B47-B68C-0681912A50B6}" type="datetimeFigureOut">
               <a:rPr lang="en-US" smtClean="0"/>
               <a:pPr/>
-              <a:t>6/19/2010</a:t>
+              <a:t>9/8/2010</a:t>
             </a:fld>
             <a:endParaRPr lang="en-US"/>
           </a:p>
@@ -596,7 +602,41 @@
           </a:bodyPr>
           <a:lstStyle/>
           <a:p>
-            <a:endParaRPr lang="en-US" dirty="0"/>
+            <a:r>
+              <a:rPr lang="en-US" dirty="0" smtClean="0"/>
+              <a:t>Product already using </a:t>
+            </a:r>
+          </a:p>
+          <a:p>
+            <a:endParaRPr lang="en-US" dirty="0" smtClean="0"/>
+          </a:p>
+          <a:p>
+            <a:r>
+              <a:rPr lang="en-US" dirty="0" err="1" smtClean="0"/>
+              <a:t>versionBuilder</a:t>
+            </a:r>
+            <a:endParaRPr lang="en-US" dirty="0" smtClean="0"/>
+          </a:p>
+          <a:p>
+            <a:r>
+              <a:rPr lang="en-US" dirty="0" err="1" smtClean="0"/>
+              <a:t>environmentBuilder</a:t>
+            </a:r>
+            <a:endParaRPr lang="en-US" dirty="0" smtClean="0"/>
+          </a:p>
+          <a:p>
+            <a:r>
+              <a:rPr lang="en-US" dirty="0" err="1" smtClean="0"/>
+              <a:t>docBuilder</a:t>
+            </a:r>
+            <a:r>
+              <a:rPr lang="en-US" dirty="0" smtClean="0"/>
+              <a:t>?</a:t>
+            </a:r>
+            <a:endParaRPr lang="en-US" smtClean="0"/>
+          </a:p>
+          <a:p>
+            <a:endParaRPr lang="en-US"/>
           </a:p>
         </p:txBody>
       </p:sp>
@@ -618,123 +658,7 @@
             <a:fld id="{A1D642FB-5C7D-46F5-ABB1-701CC3AB89E6}" type="slidenum">
               <a:rPr lang="en-US" smtClean="0"/>
               <a:pPr/>
-              <a:t>3</a:t>
-            </a:fld>
-            <a:endParaRPr lang="en-US"/>
-          </a:p>
-        </p:txBody>
-      </p:sp>
-    </p:spTree>
-  </p:cSld>
-  <p:clrMapOvr>
-    <a:masterClrMapping/>
-  </p:clrMapOvr>
-</p:notes>
-</file>
-
-<file path=ppt/notesSlides/notesSlide3.xml><?xml version="1.0" encoding="utf-8"?>
-<p:notes xmlns:a="http://schemas.openxmlformats.org/drawingml/2006/main" xmlns:r="http://schemas.openxmlformats.org/officeDocument/2006/relationships" xmlns:p="http://schemas.openxmlformats.org/presentationml/2006/main">
-  <p:cSld>
-    <p:spTree>
-      <p:nvGrpSpPr>
-        <p:cNvPr id="1" name=""/>
-        <p:cNvGrpSpPr/>
-        <p:nvPr/>
-      </p:nvGrpSpPr>
-      <p:grpSpPr>
-        <a:xfrm>
-          <a:off x="0" y="0"/>
-          <a:ext cx="0" cy="0"/>
-          <a:chOff x="0" y="0"/>
-          <a:chExt cx="0" cy="0"/>
-        </a:xfrm>
-      </p:grpSpPr>
-      <p:sp>
-        <p:nvSpPr>
-          <p:cNvPr id="2" name="Slide Image Placeholder 1"/>
-          <p:cNvSpPr>
-            <a:spLocks noGrp="1" noRot="1" noChangeAspect="1"/>
-          </p:cNvSpPr>
-          <p:nvPr>
-            <p:ph type="sldImg"/>
-          </p:nvPr>
-        </p:nvSpPr>
-        <p:spPr/>
-      </p:sp>
-      <p:sp>
-        <p:nvSpPr>
-          <p:cNvPr id="3" name="Notes Placeholder 2"/>
-          <p:cNvSpPr>
-            <a:spLocks noGrp="1"/>
-          </p:cNvSpPr>
-          <p:nvPr>
-            <p:ph type="body" idx="1"/>
-          </p:nvPr>
-        </p:nvSpPr>
-        <p:spPr/>
-        <p:txBody>
-          <a:bodyPr>
-            <a:normAutofit/>
-          </a:bodyPr>
-          <a:lstStyle/>
-          <a:p>
-            <a:r>
-              <a:rPr lang="en-US" dirty="0" smtClean="0"/>
-              <a:t>Product already using </a:t>
-            </a:r>
-          </a:p>
-          <a:p>
-            <a:endParaRPr lang="en-US" dirty="0" smtClean="0"/>
-          </a:p>
-          <a:p>
-            <a:r>
-              <a:rPr lang="en-US" dirty="0" err="1" smtClean="0"/>
-              <a:t>versionBuilder</a:t>
-            </a:r>
-            <a:endParaRPr lang="en-US" dirty="0" smtClean="0"/>
-          </a:p>
-          <a:p>
-            <a:r>
-              <a:rPr lang="en-US" dirty="0" err="1" smtClean="0"/>
-              <a:t>environmentBuilder</a:t>
-            </a:r>
-            <a:endParaRPr lang="en-US" dirty="0" smtClean="0"/>
-          </a:p>
-          <a:p>
-            <a:r>
-              <a:rPr lang="en-US" dirty="0" err="1" smtClean="0"/>
-              <a:t>docBuilder</a:t>
-            </a:r>
-            <a:r>
-              <a:rPr lang="en-US" dirty="0" smtClean="0"/>
-              <a:t>?</a:t>
-            </a:r>
-            <a:endParaRPr lang="en-US" smtClean="0"/>
-          </a:p>
-          <a:p>
-            <a:endParaRPr lang="en-US"/>
-          </a:p>
-        </p:txBody>
-      </p:sp>
-      <p:sp>
-        <p:nvSpPr>
-          <p:cNvPr id="4" name="Slide Number Placeholder 3"/>
-          <p:cNvSpPr>
-            <a:spLocks noGrp="1"/>
-          </p:cNvSpPr>
-          <p:nvPr>
-            <p:ph type="sldNum" sz="quarter" idx="10"/>
-          </p:nvPr>
-        </p:nvSpPr>
-        <p:spPr/>
-        <p:txBody>
-          <a:bodyPr/>
-          <a:lstStyle/>
-          <a:p>
-            <a:fld id="{A1D642FB-5C7D-46F5-ABB1-701CC3AB89E6}" type="slidenum">
-              <a:rPr lang="en-US" smtClean="0"/>
-              <a:pPr/>
-              <a:t>9</a:t>
+              <a:t>15</a:t>
             </a:fld>
             <a:endParaRPr lang="en-US"/>
           </a:p>
@@ -809,7 +733,7 @@
             <a:fld id="{08C7389D-B56E-4C42-BFE2-46A0FB05E106}" type="datetimeFigureOut">
               <a:rPr lang="en-US" smtClean="0"/>
               <a:pPr/>
-              <a:t>6/19/2010</a:t>
+              <a:t>9/8/2010</a:t>
             </a:fld>
             <a:endParaRPr lang="en-US"/>
           </a:p>
@@ -1088,7 +1012,7 @@
             <a:fld id="{08C7389D-B56E-4C42-BFE2-46A0FB05E106}" type="datetimeFigureOut">
               <a:rPr lang="en-US" smtClean="0"/>
               <a:pPr/>
-              <a:t>6/19/2010</a:t>
+              <a:t>9/8/2010</a:t>
             </a:fld>
             <a:endParaRPr lang="en-US"/>
           </a:p>
@@ -1275,7 +1199,7 @@
             <a:fld id="{08C7389D-B56E-4C42-BFE2-46A0FB05E106}" type="datetimeFigureOut">
               <a:rPr lang="en-US" smtClean="0"/>
               <a:pPr/>
-              <a:t>6/19/2010</a:t>
+              <a:t>9/8/2010</a:t>
             </a:fld>
             <a:endParaRPr lang="en-US"/>
           </a:p>
@@ -1462,7 +1386,7 @@
             <a:fld id="{08C7389D-B56E-4C42-BFE2-46A0FB05E106}" type="datetimeFigureOut">
               <a:rPr lang="en-US" smtClean="0"/>
               <a:pPr/>
-              <a:t>6/19/2010</a:t>
+              <a:t>9/8/2010</a:t>
             </a:fld>
             <a:endParaRPr lang="en-US"/>
           </a:p>
@@ -2947,7 +2871,7 @@
             <a:fld id="{08C7389D-B56E-4C42-BFE2-46A0FB05E106}" type="datetimeFigureOut">
               <a:rPr lang="en-US" smtClean="0"/>
               <a:pPr/>
-              <a:t>6/19/2010</a:t>
+              <a:t>9/8/2010</a:t>
             </a:fld>
             <a:endParaRPr lang="en-US"/>
           </a:p>
@@ -3549,7 +3473,7 @@
             <a:fld id="{08C7389D-B56E-4C42-BFE2-46A0FB05E106}" type="datetimeFigureOut">
               <a:rPr lang="en-US" smtClean="0"/>
               <a:pPr/>
-              <a:t>6/19/2010</a:t>
+              <a:t>9/8/2010</a:t>
             </a:fld>
             <a:endParaRPr lang="en-US"/>
           </a:p>
@@ -3988,7 +3912,7 @@
             <a:fld id="{08C7389D-B56E-4C42-BFE2-46A0FB05E106}" type="datetimeFigureOut">
               <a:rPr lang="en-US" smtClean="0"/>
               <a:pPr/>
-              <a:t>6/19/2010</a:t>
+              <a:t>9/8/2010</a:t>
             </a:fld>
             <a:endParaRPr lang="en-US"/>
           </a:p>
@@ -4551,7 +4475,7 @@
             <a:fld id="{08C7389D-B56E-4C42-BFE2-46A0FB05E106}" type="datetimeFigureOut">
               <a:rPr lang="en-US" smtClean="0"/>
               <a:pPr/>
-              <a:t>6/19/2010</a:t>
+              <a:t>9/8/2010</a:t>
             </a:fld>
             <a:endParaRPr lang="en-US"/>
           </a:p>
@@ -4649,7 +4573,7 @@
             <a:fld id="{08C7389D-B56E-4C42-BFE2-46A0FB05E106}" type="datetimeFigureOut">
               <a:rPr lang="en-US" smtClean="0"/>
               <a:pPr/>
-              <a:t>6/19/2010</a:t>
+              <a:t>9/8/2010</a:t>
             </a:fld>
             <a:endParaRPr lang="en-US"/>
           </a:p>
@@ -4905,7 +4829,7 @@
             <a:fld id="{08C7389D-B56E-4C42-BFE2-46A0FB05E106}" type="datetimeFigureOut">
               <a:rPr lang="en-US" smtClean="0"/>
               <a:pPr/>
-              <a:t>6/19/2010</a:t>
+              <a:t>9/8/2010</a:t>
             </a:fld>
             <a:endParaRPr lang="en-US"/>
           </a:p>
@@ -5628,7 +5552,7 @@
             <a:fld id="{08C7389D-B56E-4C42-BFE2-46A0FB05E106}" type="datetimeFigureOut">
               <a:rPr lang="en-US" smtClean="0"/>
               <a:pPr/>
-              <a:t>6/19/2010</a:t>
+              <a:t>9/8/2010</a:t>
             </a:fld>
             <a:endParaRPr lang="en-US"/>
           </a:p>
@@ -5855,7 +5779,7 @@
             <a:fld id="{08C7389D-B56E-4C42-BFE2-46A0FB05E106}" type="datetimeFigureOut">
               <a:rPr lang="en-US" smtClean="0"/>
               <a:pPr/>
-              <a:t>6/19/2010</a:t>
+              <a:t>9/8/2010</a:t>
             </a:fld>
             <a:endParaRPr lang="en-US"/>
           </a:p>
@@ -6381,6 +6305,545 @@
           <a:chExt cx="0" cy="0"/>
         </a:xfrm>
       </p:grpSpPr>
+      <p:sp>
+        <p:nvSpPr>
+          <p:cNvPr id="2" name="Title 1"/>
+          <p:cNvSpPr>
+            <a:spLocks noGrp="1"/>
+          </p:cNvSpPr>
+          <p:nvPr>
+            <p:ph type="title"/>
+          </p:nvPr>
+        </p:nvSpPr>
+        <p:spPr/>
+        <p:txBody>
+          <a:bodyPr/>
+          <a:lstStyle/>
+          <a:p>
+            <a:r>
+              <a:rPr lang="en-US" dirty="0" smtClean="0"/>
+              <a:t>Environment Awareness</a:t>
+            </a:r>
+            <a:endParaRPr lang="en-US" dirty="0"/>
+          </a:p>
+        </p:txBody>
+      </p:sp>
+      <p:sp>
+        <p:nvSpPr>
+          <p:cNvPr id="3" name="Content Placeholder 2"/>
+          <p:cNvSpPr>
+            <a:spLocks noGrp="1"/>
+          </p:cNvSpPr>
+          <p:nvPr>
+            <p:ph idx="1"/>
+          </p:nvPr>
+        </p:nvSpPr>
+        <p:spPr/>
+        <p:txBody>
+          <a:bodyPr/>
+          <a:lstStyle/>
+          <a:p>
+            <a:r>
+              <a:rPr lang="en-US" dirty="0" smtClean="0"/>
+              <a:t>Scripts meant for an environment will only run in that environment</a:t>
+            </a:r>
+          </a:p>
+          <a:p>
+            <a:r>
+              <a:rPr lang="en-US" dirty="0" smtClean="0"/>
+              <a:t>Default is “LOCAL”</a:t>
+            </a:r>
+          </a:p>
+        </p:txBody>
+      </p:sp>
+    </p:spTree>
+  </p:cSld>
+  <p:clrMapOvr>
+    <a:masterClrMapping/>
+  </p:clrMapOvr>
+</p:sld>
+</file>
+
+<file path=ppt/slides/slide11.xml><?xml version="1.0" encoding="utf-8"?>
+<p:sld xmlns:a="http://schemas.openxmlformats.org/drawingml/2006/main" xmlns:r="http://schemas.openxmlformats.org/officeDocument/2006/relationships" xmlns:p="http://schemas.openxmlformats.org/presentationml/2006/main">
+  <p:cSld>
+    <p:spTree>
+      <p:nvGrpSpPr>
+        <p:cNvPr id="1" name=""/>
+        <p:cNvGrpSpPr/>
+        <p:nvPr/>
+      </p:nvGrpSpPr>
+      <p:grpSpPr>
+        <a:xfrm>
+          <a:off x="0" y="0"/>
+          <a:ext cx="0" cy="0"/>
+          <a:chOff x="0" y="0"/>
+          <a:chExt cx="0" cy="0"/>
+        </a:xfrm>
+      </p:grpSpPr>
+      <p:sp>
+        <p:nvSpPr>
+          <p:cNvPr id="2" name="Title 1"/>
+          <p:cNvSpPr>
+            <a:spLocks noGrp="1"/>
+          </p:cNvSpPr>
+          <p:nvPr>
+            <p:ph type="title"/>
+          </p:nvPr>
+        </p:nvSpPr>
+        <p:spPr/>
+        <p:txBody>
+          <a:bodyPr/>
+          <a:lstStyle/>
+          <a:p>
+            <a:r>
+              <a:rPr lang="en-US" dirty="0" smtClean="0"/>
+              <a:t>Easy to use</a:t>
+            </a:r>
+            <a:endParaRPr lang="en-US" dirty="0"/>
+          </a:p>
+        </p:txBody>
+      </p:sp>
+      <p:sp>
+        <p:nvSpPr>
+          <p:cNvPr id="3" name="Content Placeholder 2"/>
+          <p:cNvSpPr>
+            <a:spLocks noGrp="1"/>
+          </p:cNvSpPr>
+          <p:nvPr>
+            <p:ph idx="1"/>
+          </p:nvPr>
+        </p:nvSpPr>
+        <p:spPr/>
+        <p:txBody>
+          <a:bodyPr/>
+          <a:lstStyle/>
+          <a:p>
+            <a:r>
+              <a:rPr lang="en-US" dirty="0" smtClean="0"/>
+              <a:t>One required parameter (/d) for database</a:t>
+            </a:r>
+          </a:p>
+          <a:p>
+            <a:r>
+              <a:rPr lang="en-US" dirty="0" smtClean="0"/>
+              <a:t>Folder format</a:t>
+            </a:r>
+          </a:p>
+          <a:p>
+            <a:r>
+              <a:rPr lang="en-US" dirty="0" smtClean="0"/>
+              <a:t>Comes with samples</a:t>
+            </a:r>
+            <a:endParaRPr lang="en-US" dirty="0"/>
+          </a:p>
+        </p:txBody>
+      </p:sp>
+    </p:spTree>
+  </p:cSld>
+  <p:clrMapOvr>
+    <a:masterClrMapping/>
+  </p:clrMapOvr>
+</p:sld>
+</file>
+
+<file path=ppt/slides/slide12.xml><?xml version="1.0" encoding="utf-8"?>
+<p:sld xmlns:a="http://schemas.openxmlformats.org/drawingml/2006/main" xmlns:r="http://schemas.openxmlformats.org/officeDocument/2006/relationships" xmlns:p="http://schemas.openxmlformats.org/presentationml/2006/main">
+  <p:cSld>
+    <p:spTree>
+      <p:nvGrpSpPr>
+        <p:cNvPr id="1" name=""/>
+        <p:cNvGrpSpPr/>
+        <p:nvPr/>
+      </p:nvGrpSpPr>
+      <p:grpSpPr>
+        <a:xfrm>
+          <a:off x="0" y="0"/>
+          <a:ext cx="0" cy="0"/>
+          <a:chOff x="0" y="0"/>
+          <a:chExt cx="0" cy="0"/>
+        </a:xfrm>
+      </p:grpSpPr>
+      <p:sp>
+        <p:nvSpPr>
+          <p:cNvPr id="2" name="Title 1"/>
+          <p:cNvSpPr>
+            <a:spLocks noGrp="1"/>
+          </p:cNvSpPr>
+          <p:nvPr>
+            <p:ph type="title"/>
+          </p:nvPr>
+        </p:nvSpPr>
+        <p:spPr/>
+        <p:txBody>
+          <a:bodyPr/>
+          <a:lstStyle/>
+          <a:p>
+            <a:r>
+              <a:rPr lang="en-US" dirty="0" smtClean="0"/>
+              <a:t>Conventions / Customizable</a:t>
+            </a:r>
+            <a:endParaRPr lang="en-US" dirty="0"/>
+          </a:p>
+        </p:txBody>
+      </p:sp>
+      <p:sp>
+        <p:nvSpPr>
+          <p:cNvPr id="3" name="Content Placeholder 2"/>
+          <p:cNvSpPr>
+            <a:spLocks noGrp="1"/>
+          </p:cNvSpPr>
+          <p:nvPr>
+            <p:ph idx="1"/>
+          </p:nvPr>
+        </p:nvSpPr>
+        <p:spPr/>
+        <p:txBody>
+          <a:bodyPr/>
+          <a:lstStyle/>
+          <a:p>
+            <a:r>
+              <a:rPr lang="en-US" dirty="0" smtClean="0"/>
+              <a:t>Don’t like RoundhousE as the schema? Change it</a:t>
+            </a:r>
+          </a:p>
+          <a:p>
+            <a:r>
+              <a:rPr lang="en-US" dirty="0" smtClean="0"/>
+              <a:t>Don’t like the “up” folder? Change it</a:t>
+            </a:r>
+          </a:p>
+          <a:p>
+            <a:r>
+              <a:rPr lang="en-US" dirty="0" smtClean="0"/>
+              <a:t>Don’t like </a:t>
+            </a:r>
+            <a:r>
+              <a:rPr lang="en-US" dirty="0" err="1" smtClean="0"/>
+              <a:t>xxxxx</a:t>
+            </a:r>
+            <a:r>
+              <a:rPr lang="en-US" dirty="0" smtClean="0"/>
+              <a:t>? Change it</a:t>
+            </a:r>
+          </a:p>
+          <a:p>
+            <a:endParaRPr lang="en-US" dirty="0"/>
+          </a:p>
+        </p:txBody>
+      </p:sp>
+    </p:spTree>
+  </p:cSld>
+  <p:clrMapOvr>
+    <a:masterClrMapping/>
+  </p:clrMapOvr>
+</p:sld>
+</file>
+
+<file path=ppt/slides/slide13.xml><?xml version="1.0" encoding="utf-8"?>
+<p:sld xmlns:a="http://schemas.openxmlformats.org/drawingml/2006/main" xmlns:r="http://schemas.openxmlformats.org/officeDocument/2006/relationships" xmlns:p="http://schemas.openxmlformats.org/presentationml/2006/main">
+  <p:cSld>
+    <p:spTree>
+      <p:nvGrpSpPr>
+        <p:cNvPr id="1" name=""/>
+        <p:cNvGrpSpPr/>
+        <p:nvPr/>
+      </p:nvGrpSpPr>
+      <p:grpSpPr>
+        <a:xfrm>
+          <a:off x="0" y="0"/>
+          <a:ext cx="0" cy="0"/>
+          <a:chOff x="0" y="0"/>
+          <a:chExt cx="0" cy="0"/>
+        </a:xfrm>
+      </p:grpSpPr>
+      <p:sp>
+        <p:nvSpPr>
+          <p:cNvPr id="2" name="Title 1"/>
+          <p:cNvSpPr>
+            <a:spLocks noGrp="1"/>
+          </p:cNvSpPr>
+          <p:nvPr>
+            <p:ph type="title"/>
+          </p:nvPr>
+        </p:nvSpPr>
+        <p:spPr/>
+        <p:txBody>
+          <a:bodyPr/>
+          <a:lstStyle/>
+          <a:p>
+            <a:r>
+              <a:rPr lang="en-US" dirty="0" smtClean="0"/>
+              <a:t>How do I get RoundhousE?</a:t>
+            </a:r>
+            <a:endParaRPr lang="en-US" dirty="0"/>
+          </a:p>
+        </p:txBody>
+      </p:sp>
+      <p:sp>
+        <p:nvSpPr>
+          <p:cNvPr id="3" name="Content Placeholder 2"/>
+          <p:cNvSpPr>
+            <a:spLocks noGrp="1"/>
+          </p:cNvSpPr>
+          <p:nvPr>
+            <p:ph idx="1"/>
+          </p:nvPr>
+        </p:nvSpPr>
+        <p:spPr/>
+        <p:txBody>
+          <a:bodyPr>
+            <a:normAutofit lnSpcReduction="10000"/>
+          </a:bodyPr>
+          <a:lstStyle/>
+          <a:p>
+            <a:r>
+              <a:rPr lang="en-US" dirty="0" smtClean="0"/>
+              <a:t>gem install roundhouse</a:t>
+            </a:r>
+          </a:p>
+          <a:p>
+            <a:r>
+              <a:rPr lang="en-US" dirty="0" smtClean="0"/>
+              <a:t>nu install roundhouse (bring to your project)</a:t>
+            </a:r>
+          </a:p>
+          <a:p>
+            <a:endParaRPr lang="en-US" dirty="0" smtClean="0"/>
+          </a:p>
+          <a:p>
+            <a:r>
+              <a:rPr lang="en-US" dirty="0" smtClean="0"/>
+              <a:t>Source (</a:t>
+            </a:r>
+            <a:r>
+              <a:rPr lang="en-US" dirty="0" err="1" smtClean="0"/>
+              <a:t>git</a:t>
+            </a:r>
+            <a:r>
+              <a:rPr lang="en-US" dirty="0" smtClean="0"/>
+              <a:t> / </a:t>
+            </a:r>
+            <a:r>
+              <a:rPr lang="en-US" dirty="0" err="1" smtClean="0"/>
+              <a:t>svn</a:t>
+            </a:r>
+            <a:r>
+              <a:rPr lang="en-US" dirty="0" smtClean="0"/>
+              <a:t>) – projectroundhouse.org</a:t>
+            </a:r>
+          </a:p>
+          <a:p>
+            <a:endParaRPr lang="en-US" dirty="0" smtClean="0"/>
+          </a:p>
+          <a:p>
+            <a:r>
+              <a:rPr lang="en-US" dirty="0" smtClean="0"/>
+              <a:t>Old fashioned download – projectroundhouse.org</a:t>
+            </a:r>
+          </a:p>
+          <a:p>
+            <a:endParaRPr lang="en-US" dirty="0" smtClean="0"/>
+          </a:p>
+        </p:txBody>
+      </p:sp>
+    </p:spTree>
+  </p:cSld>
+  <p:clrMapOvr>
+    <a:masterClrMapping/>
+  </p:clrMapOvr>
+</p:sld>
+</file>
+
+<file path=ppt/slides/slide14.xml><?xml version="1.0" encoding="utf-8"?>
+<p:sld xmlns:a="http://schemas.openxmlformats.org/drawingml/2006/main" xmlns:r="http://schemas.openxmlformats.org/officeDocument/2006/relationships" xmlns:p="http://schemas.openxmlformats.org/presentationml/2006/main">
+  <p:cSld>
+    <p:spTree>
+      <p:nvGrpSpPr>
+        <p:cNvPr id="1" name=""/>
+        <p:cNvGrpSpPr/>
+        <p:nvPr/>
+      </p:nvGrpSpPr>
+      <p:grpSpPr>
+        <a:xfrm>
+          <a:off x="0" y="0"/>
+          <a:ext cx="0" cy="0"/>
+          <a:chOff x="0" y="0"/>
+          <a:chExt cx="0" cy="0"/>
+        </a:xfrm>
+      </p:grpSpPr>
+      <p:sp>
+        <p:nvSpPr>
+          <p:cNvPr id="2" name="Title 1"/>
+          <p:cNvSpPr>
+            <a:spLocks noGrp="1"/>
+          </p:cNvSpPr>
+          <p:nvPr>
+            <p:ph type="title"/>
+          </p:nvPr>
+        </p:nvSpPr>
+        <p:spPr/>
+        <p:txBody>
+          <a:bodyPr/>
+          <a:lstStyle/>
+          <a:p>
+            <a:r>
+              <a:rPr lang="en-US" dirty="0" smtClean="0"/>
+              <a:t>Asking questions</a:t>
+            </a:r>
+            <a:endParaRPr lang="en-US" dirty="0"/>
+          </a:p>
+        </p:txBody>
+      </p:sp>
+      <p:sp>
+        <p:nvSpPr>
+          <p:cNvPr id="3" name="Content Placeholder 2"/>
+          <p:cNvSpPr>
+            <a:spLocks noGrp="1"/>
+          </p:cNvSpPr>
+          <p:nvPr>
+            <p:ph idx="1"/>
+          </p:nvPr>
+        </p:nvSpPr>
+        <p:spPr/>
+        <p:txBody>
+          <a:bodyPr/>
+          <a:lstStyle/>
+          <a:p>
+            <a:r>
+              <a:rPr lang="en-US" dirty="0" smtClean="0"/>
+              <a:t>Chuck Norris Framework</a:t>
+            </a:r>
+          </a:p>
+          <a:p>
+            <a:r>
+              <a:rPr lang="en-US" dirty="0" smtClean="0"/>
+              <a:t>http://</a:t>
+            </a:r>
+            <a:r>
+              <a:rPr lang="en-US" dirty="0" smtClean="0"/>
+              <a:t>groups.google.com/group/chucknorrisframework </a:t>
+            </a:r>
+          </a:p>
+          <a:p>
+            <a:r>
+              <a:rPr lang="en-US" dirty="0" smtClean="0"/>
+              <a:t>@</a:t>
+            </a:r>
+            <a:r>
+              <a:rPr lang="en-US" dirty="0" err="1" smtClean="0"/>
+              <a:t>Roundhouse_DB</a:t>
+            </a:r>
+            <a:endParaRPr lang="en-US" dirty="0"/>
+          </a:p>
+        </p:txBody>
+      </p:sp>
+    </p:spTree>
+  </p:cSld>
+  <p:clrMapOvr>
+    <a:masterClrMapping/>
+  </p:clrMapOvr>
+  <p:timing>
+    <p:tnLst>
+      <p:par>
+        <p:cTn id="1" dur="indefinite" restart="never" nodeType="tmRoot"/>
+      </p:par>
+    </p:tnLst>
+  </p:timing>
+</p:sld>
+</file>
+
+<file path=ppt/slides/slide15.xml><?xml version="1.0" encoding="utf-8"?>
+<p:sld xmlns:a="http://schemas.openxmlformats.org/drawingml/2006/main" xmlns:r="http://schemas.openxmlformats.org/officeDocument/2006/relationships" xmlns:p="http://schemas.openxmlformats.org/presentationml/2006/main">
+  <p:cSld>
+    <p:spTree>
+      <p:nvGrpSpPr>
+        <p:cNvPr id="1" name=""/>
+        <p:cNvGrpSpPr/>
+        <p:nvPr/>
+      </p:nvGrpSpPr>
+      <p:grpSpPr>
+        <a:xfrm>
+          <a:off x="0" y="0"/>
+          <a:ext cx="0" cy="0"/>
+          <a:chOff x="0" y="0"/>
+          <a:chExt cx="0" cy="0"/>
+        </a:xfrm>
+      </p:grpSpPr>
+      <p:sp>
+        <p:nvSpPr>
+          <p:cNvPr id="2" name="Title 1"/>
+          <p:cNvSpPr>
+            <a:spLocks noGrp="1"/>
+          </p:cNvSpPr>
+          <p:nvPr>
+            <p:ph type="title"/>
+          </p:nvPr>
+        </p:nvSpPr>
+        <p:spPr/>
+        <p:txBody>
+          <a:bodyPr/>
+          <a:lstStyle/>
+          <a:p>
+            <a:r>
+              <a:rPr lang="en-US" dirty="0" smtClean="0"/>
+              <a:t>Let the demos begin</a:t>
+            </a:r>
+            <a:endParaRPr lang="en-US" dirty="0"/>
+          </a:p>
+        </p:txBody>
+      </p:sp>
+      <p:sp>
+        <p:nvSpPr>
+          <p:cNvPr id="3" name="Content Placeholder 2"/>
+          <p:cNvSpPr>
+            <a:spLocks noGrp="1"/>
+          </p:cNvSpPr>
+          <p:nvPr>
+            <p:ph idx="1"/>
+          </p:nvPr>
+        </p:nvSpPr>
+        <p:spPr/>
+        <p:txBody>
+          <a:bodyPr/>
+          <a:lstStyle/>
+          <a:p>
+            <a:endParaRPr lang="en-US"/>
+          </a:p>
+        </p:txBody>
+      </p:sp>
+    </p:spTree>
+  </p:cSld>
+  <p:clrMapOvr>
+    <a:masterClrMapping/>
+  </p:clrMapOvr>
+  <p:timing>
+    <p:tnLst>
+      <p:par>
+        <p:cTn id="1" dur="indefinite" restart="never" nodeType="tmRoot"/>
+      </p:par>
+    </p:tnLst>
+  </p:timing>
+</p:sld>
+</file>
+
+<file path=ppt/slides/slide16.xml><?xml version="1.0" encoding="utf-8"?>
+<p:sld xmlns:a="http://schemas.openxmlformats.org/drawingml/2006/main" xmlns:r="http://schemas.openxmlformats.org/officeDocument/2006/relationships" xmlns:p="http://schemas.openxmlformats.org/presentationml/2006/main">
+  <p:cSld>
+    <p:spTree>
+      <p:nvGrpSpPr>
+        <p:cNvPr id="1" name=""/>
+        <p:cNvGrpSpPr/>
+        <p:nvPr/>
+      </p:nvGrpSpPr>
+      <p:grpSpPr>
+        <a:xfrm>
+          <a:off x="0" y="0"/>
+          <a:ext cx="0" cy="0"/>
+          <a:chOff x="0" y="0"/>
+          <a:chExt cx="0" cy="0"/>
+        </a:xfrm>
+      </p:grpSpPr>
       <p:pic>
         <p:nvPicPr>
           <p:cNvPr id="6" name="Picture 5" descr="UppercuTInvertWithLink.gif"/>
@@ -6547,882 +7010,59 @@
       </p:grpSpPr>
       <p:sp>
         <p:nvSpPr>
-          <p:cNvPr id="19" name="Rectangle 18"/>
-          <p:cNvSpPr/>
-          <p:nvPr/>
-        </p:nvSpPr>
-        <p:spPr>
-          <a:xfrm>
-            <a:off x="460428" y="76200"/>
-            <a:ext cx="8226371" cy="2286000"/>
-          </a:xfrm>
-          <a:prstGeom prst="rect">
-            <a:avLst/>
-          </a:prstGeom>
-          <a:noFill/>
-          <a:ln>
-            <a:solidFill>
-              <a:schemeClr val="bg2">
-                <a:lumMod val="25000"/>
-                <a:lumOff val="75000"/>
-              </a:schemeClr>
-            </a:solidFill>
-          </a:ln>
-        </p:spPr>
-        <p:style>
-          <a:lnRef idx="2">
-            <a:schemeClr val="accent1">
-              <a:shade val="50000"/>
-            </a:schemeClr>
-          </a:lnRef>
-          <a:fillRef idx="1">
-            <a:schemeClr val="accent1"/>
-          </a:fillRef>
-          <a:effectRef idx="0">
-            <a:schemeClr val="accent1"/>
-          </a:effectRef>
-          <a:fontRef idx="minor">
-            <a:schemeClr val="lt1"/>
-          </a:fontRef>
-        </p:style>
-        <p:txBody>
-          <a:bodyPr rtlCol="0" anchor="ctr"/>
+          <p:cNvPr id="2" name="Title 1"/>
+          <p:cNvSpPr>
+            <a:spLocks noGrp="1"/>
+          </p:cNvSpPr>
+          <p:nvPr>
+            <p:ph type="title"/>
+          </p:nvPr>
+        </p:nvSpPr>
+        <p:spPr/>
+        <p:txBody>
+          <a:bodyPr/>
           <a:lstStyle/>
           <a:p>
-            <a:pPr algn="ctr"/>
-            <a:endParaRPr lang="en-US"/>
-          </a:p>
-        </p:txBody>
-      </p:sp>
-      <p:sp>
-        <p:nvSpPr>
-          <p:cNvPr id="20" name="Rectangle 19"/>
-          <p:cNvSpPr/>
-          <p:nvPr/>
-        </p:nvSpPr>
-        <p:spPr>
-          <a:xfrm>
-            <a:off x="5181600" y="4289502"/>
-            <a:ext cx="3505200" cy="1443335"/>
-          </a:xfrm>
-          <a:prstGeom prst="rect">
-            <a:avLst/>
-          </a:prstGeom>
-          <a:noFill/>
-          <a:ln>
-            <a:solidFill>
-              <a:schemeClr val="accent2">
-                <a:lumMod val="50000"/>
-              </a:schemeClr>
-            </a:solidFill>
-          </a:ln>
-        </p:spPr>
-        <p:style>
-          <a:lnRef idx="2">
-            <a:schemeClr val="accent1">
-              <a:shade val="50000"/>
-            </a:schemeClr>
-          </a:lnRef>
-          <a:fillRef idx="1">
-            <a:schemeClr val="accent1"/>
-          </a:fillRef>
-          <a:effectRef idx="0">
-            <a:schemeClr val="accent1"/>
-          </a:effectRef>
-          <a:fontRef idx="minor">
-            <a:schemeClr val="lt1"/>
-          </a:fontRef>
-        </p:style>
-        <p:txBody>
-          <a:bodyPr rtlCol="0" anchor="ctr"/>
+            <a:r>
+              <a:rPr lang="en-US" dirty="0" smtClean="0"/>
+              <a:t>Before We Start</a:t>
+            </a:r>
+            <a:endParaRPr lang="en-US" dirty="0"/>
+          </a:p>
+        </p:txBody>
+      </p:sp>
+      <p:sp>
+        <p:nvSpPr>
+          <p:cNvPr id="3" name="Content Placeholder 2"/>
+          <p:cNvSpPr>
+            <a:spLocks noGrp="1"/>
+          </p:cNvSpPr>
+          <p:nvPr>
+            <p:ph idx="1"/>
+          </p:nvPr>
+        </p:nvSpPr>
+        <p:spPr/>
+        <p:txBody>
+          <a:bodyPr/>
           <a:lstStyle/>
           <a:p>
-            <a:pPr algn="ctr"/>
-            <a:endParaRPr lang="en-US"/>
-          </a:p>
-        </p:txBody>
-      </p:sp>
-      <p:sp>
-        <p:nvSpPr>
-          <p:cNvPr id="21" name="Rectangle 20"/>
-          <p:cNvSpPr/>
-          <p:nvPr/>
-        </p:nvSpPr>
-        <p:spPr>
-          <a:xfrm>
-            <a:off x="460429" y="4289502"/>
-            <a:ext cx="4644971" cy="1443335"/>
-          </a:xfrm>
-          <a:prstGeom prst="rect">
-            <a:avLst/>
-          </a:prstGeom>
-          <a:noFill/>
-          <a:ln>
-            <a:solidFill>
-              <a:schemeClr val="tx1">
-                <a:lumMod val="65000"/>
-              </a:schemeClr>
-            </a:solidFill>
-          </a:ln>
-        </p:spPr>
-        <p:style>
-          <a:lnRef idx="2">
-            <a:schemeClr val="accent1">
-              <a:shade val="50000"/>
-            </a:schemeClr>
-          </a:lnRef>
-          <a:fillRef idx="1">
-            <a:schemeClr val="accent1"/>
-          </a:fillRef>
-          <a:effectRef idx="0">
-            <a:schemeClr val="accent1"/>
-          </a:effectRef>
-          <a:fontRef idx="minor">
-            <a:schemeClr val="lt1"/>
-          </a:fontRef>
-        </p:style>
-        <p:txBody>
-          <a:bodyPr rtlCol="0" anchor="ctr"/>
-          <a:lstStyle/>
-          <a:p>
-            <a:pPr algn="ctr"/>
-            <a:endParaRPr lang="en-US"/>
-          </a:p>
-        </p:txBody>
-      </p:sp>
-      <p:sp>
-        <p:nvSpPr>
-          <p:cNvPr id="22" name="Rectangle 21"/>
-          <p:cNvSpPr/>
-          <p:nvPr/>
-        </p:nvSpPr>
-        <p:spPr>
-          <a:xfrm>
-            <a:off x="460428" y="2438400"/>
-            <a:ext cx="8226371" cy="1795033"/>
-          </a:xfrm>
-          <a:prstGeom prst="rect">
-            <a:avLst/>
-          </a:prstGeom>
-          <a:noFill/>
-          <a:ln>
-            <a:solidFill>
-              <a:schemeClr val="tx2">
-                <a:lumMod val="40000"/>
-                <a:lumOff val="60000"/>
-              </a:schemeClr>
-            </a:solidFill>
-          </a:ln>
-        </p:spPr>
-        <p:style>
-          <a:lnRef idx="2">
-            <a:schemeClr val="accent1">
-              <a:shade val="50000"/>
-            </a:schemeClr>
-          </a:lnRef>
-          <a:fillRef idx="1">
-            <a:schemeClr val="accent1"/>
-          </a:fillRef>
-          <a:effectRef idx="0">
-            <a:schemeClr val="accent1"/>
-          </a:effectRef>
-          <a:fontRef idx="minor">
-            <a:schemeClr val="lt1"/>
-          </a:fontRef>
-        </p:style>
-        <p:txBody>
-          <a:bodyPr rtlCol="0" anchor="ctr"/>
-          <a:lstStyle/>
-          <a:p>
-            <a:pPr algn="ctr"/>
-            <a:endParaRPr lang="en-US"/>
-          </a:p>
-        </p:txBody>
-      </p:sp>
-      <p:sp>
-        <p:nvSpPr>
-          <p:cNvPr id="23" name="Rectangle 22"/>
-          <p:cNvSpPr/>
-          <p:nvPr/>
-        </p:nvSpPr>
-        <p:spPr>
-          <a:xfrm>
-            <a:off x="350328" y="5934670"/>
-            <a:ext cx="8476808" cy="923330"/>
-          </a:xfrm>
-          <a:prstGeom prst="rect">
-            <a:avLst/>
-          </a:prstGeom>
-          <a:noFill/>
-        </p:spPr>
-        <p:txBody>
-          <a:bodyPr wrap="none" lIns="91440" tIns="45720" rIns="91440" bIns="45720">
-            <a:spAutoFit/>
-            <a:scene3d>
-              <a:camera prst="orthographicFront"/>
-              <a:lightRig rig="brightRoom" dir="t"/>
-            </a:scene3d>
-            <a:sp3d contourW="6350" prstMaterial="plastic">
-              <a:bevelT w="20320" h="20320" prst="angle"/>
-              <a:contourClr>
-                <a:schemeClr val="accent1">
-                  <a:tint val="100000"/>
-                  <a:shade val="100000"/>
-                  <a:hueMod val="100000"/>
-                  <a:satMod val="100000"/>
-                </a:schemeClr>
-              </a:contourClr>
-            </a:sp3d>
-          </a:bodyPr>
-          <a:lstStyle/>
-          <a:p>
-            <a:pPr algn="ctr"/>
-            <a:r>
-              <a:rPr lang="en-US" sz="5400" b="1" cap="all" dirty="0" smtClean="0">
-                <a:ln/>
-                <a:solidFill>
-                  <a:schemeClr val="tx2">
-                    <a:lumMod val="60000"/>
-                    <a:lumOff val="40000"/>
-                  </a:schemeClr>
-                </a:solidFill>
-                <a:effectLst>
-                  <a:outerShdw blurRad="19685" dist="12700" dir="5400000" algn="tl" rotWithShape="0">
-                    <a:schemeClr val="accent1">
-                      <a:satMod val="130000"/>
-                      <a:alpha val="60000"/>
-                    </a:schemeClr>
-                  </a:outerShdw>
-                  <a:reflection blurRad="10000" stA="55000" endPos="48000" dist="500" dir="5400000" sy="-100000" algn="bl" rotWithShape="0"/>
-                </a:effectLst>
-              </a:rPr>
-              <a:t>Thanks to our sponsors!</a:t>
-            </a:r>
-            <a:endParaRPr lang="en-US" sz="5400" b="1" cap="all" dirty="0">
-              <a:ln/>
-              <a:solidFill>
-                <a:schemeClr val="tx2">
-                  <a:lumMod val="60000"/>
-                  <a:lumOff val="40000"/>
-                </a:schemeClr>
-              </a:solidFill>
-              <a:effectLst>
-                <a:outerShdw blurRad="19685" dist="12700" dir="5400000" algn="tl" rotWithShape="0">
-                  <a:schemeClr val="accent1">
-                    <a:satMod val="130000"/>
-                    <a:alpha val="60000"/>
-                  </a:schemeClr>
-                </a:outerShdw>
-                <a:reflection blurRad="10000" stA="55000" endPos="48000" dist="500" dir="5400000" sy="-100000" algn="bl" rotWithShape="0"/>
-              </a:effectLst>
-            </a:endParaRPr>
-          </a:p>
-        </p:txBody>
-      </p:sp>
-      <p:pic>
-        <p:nvPicPr>
-          <p:cNvPr id="24" name="Picture 2" descr="E:\Pictures\KCDC\Sponsors\TypeMock\Typemock_logo_web.jpg"/>
-          <p:cNvPicPr>
-            <a:picLocks noChangeAspect="1" noChangeArrowheads="1"/>
-          </p:cNvPicPr>
-          <p:nvPr/>
-        </p:nvPicPr>
-        <p:blipFill>
-          <a:blip r:embed="rId2" cstate="print">
-            <a:extLst>
-              <a:ext uri="{28A0092B-C50C-407E-A947-70E740481C1C}">
-                <a14:useLocalDpi xmlns="" xmlns:a14="http://schemas.microsoft.com/office/drawing/2010/main" val="0"/>
-              </a:ext>
-            </a:extLst>
-          </a:blip>
-          <a:srcRect/>
-          <a:stretch>
-            <a:fillRect/>
-          </a:stretch>
-        </p:blipFill>
-        <p:spPr bwMode="auto">
-          <a:xfrm>
-            <a:off x="5410201" y="4700983"/>
-            <a:ext cx="1600199" cy="960119"/>
-          </a:xfrm>
-          <a:prstGeom prst="rect">
-            <a:avLst/>
-          </a:prstGeom>
-          <a:noFill/>
-          <a:extLst>
-            <a:ext uri="{909E8E84-426E-40DD-AFC4-6F175D3DCCD1}">
-              <a14:hiddenFill xmlns="" xmlns:a14="http://schemas.microsoft.com/office/drawing/2010/main">
-                <a:solidFill>
-                  <a:srgbClr val="FFFFFF"/>
-                </a:solidFill>
-              </a14:hiddenFill>
-            </a:ext>
-          </a:extLst>
-        </p:spPr>
-      </p:pic>
-      <p:pic>
-        <p:nvPicPr>
-          <p:cNvPr id="25" name="Picture 24"/>
-          <p:cNvPicPr>
-            <a:picLocks noChangeAspect="1"/>
-          </p:cNvPicPr>
-          <p:nvPr/>
-        </p:nvPicPr>
-        <p:blipFill>
-          <a:blip r:embed="rId3" cstate="print">
-            <a:extLst>
-              <a:ext uri="{28A0092B-C50C-407E-A947-70E740481C1C}">
-                <a14:useLocalDpi xmlns="" xmlns:a14="http://schemas.microsoft.com/office/drawing/2010/main" val="0"/>
-              </a:ext>
-            </a:extLst>
-          </a:blip>
-          <a:stretch>
-            <a:fillRect/>
-          </a:stretch>
-        </p:blipFill>
-        <p:spPr>
-          <a:xfrm>
-            <a:off x="1752600" y="3381617"/>
-            <a:ext cx="2081227" cy="831685"/>
-          </a:xfrm>
-          <a:prstGeom prst="rect">
-            <a:avLst/>
-          </a:prstGeom>
-        </p:spPr>
-      </p:pic>
-      <p:pic>
-        <p:nvPicPr>
-          <p:cNvPr id="26" name="Picture 25"/>
-          <p:cNvPicPr>
-            <a:picLocks noChangeAspect="1"/>
-          </p:cNvPicPr>
-          <p:nvPr/>
-        </p:nvPicPr>
-        <p:blipFill>
-          <a:blip r:embed="rId4" cstate="print">
-            <a:extLst>
-              <a:ext uri="{28A0092B-C50C-407E-A947-70E740481C1C}">
-                <a14:useLocalDpi xmlns="" xmlns:a14="http://schemas.microsoft.com/office/drawing/2010/main" val="0"/>
-              </a:ext>
-            </a:extLst>
-          </a:blip>
-          <a:stretch>
-            <a:fillRect/>
-          </a:stretch>
-        </p:blipFill>
-        <p:spPr>
-          <a:xfrm>
-            <a:off x="4800600" y="3406556"/>
-            <a:ext cx="1968500" cy="793738"/>
-          </a:xfrm>
-          <a:prstGeom prst="rect">
-            <a:avLst/>
-          </a:prstGeom>
-        </p:spPr>
-      </p:pic>
-      <p:sp>
-        <p:nvSpPr>
-          <p:cNvPr id="27" name="Rectangle 26"/>
-          <p:cNvSpPr/>
-          <p:nvPr/>
-        </p:nvSpPr>
-        <p:spPr>
-          <a:xfrm>
-            <a:off x="640769" y="2438400"/>
-            <a:ext cx="1641795" cy="830997"/>
-          </a:xfrm>
-          <a:prstGeom prst="rect">
-            <a:avLst/>
-          </a:prstGeom>
-          <a:noFill/>
-        </p:spPr>
-        <p:txBody>
-          <a:bodyPr wrap="none" lIns="91440" tIns="45720" rIns="91440" bIns="45720">
-            <a:spAutoFit/>
-            <a:scene3d>
-              <a:camera prst="orthographicFront"/>
-              <a:lightRig rig="brightRoom" dir="t"/>
-            </a:scene3d>
-            <a:sp3d contourW="6350" prstMaterial="plastic">
-              <a:bevelT w="20320" h="20320" prst="angle"/>
-              <a:contourClr>
-                <a:schemeClr val="accent1">
-                  <a:tint val="100000"/>
-                  <a:shade val="100000"/>
-                  <a:hueMod val="100000"/>
-                  <a:satMod val="100000"/>
-                </a:schemeClr>
-              </a:contourClr>
-            </a:sp3d>
-          </a:bodyPr>
-          <a:lstStyle/>
-          <a:p>
-            <a:pPr algn="ctr"/>
-            <a:r>
-              <a:rPr lang="en-US" sz="4800" b="1" cap="all" dirty="0" smtClean="0">
-                <a:ln/>
-                <a:solidFill>
-                  <a:schemeClr val="tx2">
-                    <a:lumMod val="60000"/>
-                    <a:lumOff val="40000"/>
-                  </a:schemeClr>
-                </a:solidFill>
-                <a:effectLst>
-                  <a:outerShdw blurRad="19685" dist="12700" dir="5400000" algn="tl" rotWithShape="0">
-                    <a:schemeClr val="accent1">
-                      <a:satMod val="130000"/>
-                      <a:alpha val="60000"/>
-                    </a:schemeClr>
-                  </a:outerShdw>
-                  <a:reflection blurRad="10000" stA="55000" endPos="48000" dist="500" dir="5400000" sy="-100000" algn="bl" rotWithShape="0"/>
-                </a:effectLst>
-              </a:rPr>
-              <a:t>GOLD</a:t>
-            </a:r>
-            <a:endParaRPr lang="en-US" sz="4800" b="1" cap="all" dirty="0">
-              <a:ln/>
-              <a:solidFill>
-                <a:schemeClr val="tx2">
-                  <a:lumMod val="60000"/>
-                  <a:lumOff val="40000"/>
-                </a:schemeClr>
-              </a:solidFill>
-              <a:effectLst>
-                <a:outerShdw blurRad="19685" dist="12700" dir="5400000" algn="tl" rotWithShape="0">
-                  <a:schemeClr val="accent1">
-                    <a:satMod val="130000"/>
-                    <a:alpha val="60000"/>
-                  </a:schemeClr>
-                </a:outerShdw>
-                <a:reflection blurRad="10000" stA="55000" endPos="48000" dist="500" dir="5400000" sy="-100000" algn="bl" rotWithShape="0"/>
-              </a:effectLst>
-            </a:endParaRPr>
-          </a:p>
-        </p:txBody>
-      </p:sp>
-      <p:sp>
-        <p:nvSpPr>
-          <p:cNvPr id="28" name="Rectangle 27"/>
-          <p:cNvSpPr/>
-          <p:nvPr/>
-        </p:nvSpPr>
-        <p:spPr>
-          <a:xfrm>
-            <a:off x="610631" y="4763951"/>
-            <a:ext cx="1671933" cy="707886"/>
-          </a:xfrm>
-          <a:prstGeom prst="rect">
-            <a:avLst/>
-          </a:prstGeom>
-          <a:noFill/>
-        </p:spPr>
-        <p:txBody>
-          <a:bodyPr wrap="none" lIns="91440" tIns="45720" rIns="91440" bIns="45720">
-            <a:spAutoFit/>
-            <a:scene3d>
-              <a:camera prst="orthographicFront"/>
-              <a:lightRig rig="brightRoom" dir="t"/>
-            </a:scene3d>
-            <a:sp3d contourW="6350" prstMaterial="plastic">
-              <a:bevelT w="20320" h="20320" prst="angle"/>
-              <a:contourClr>
-                <a:schemeClr val="accent1">
-                  <a:tint val="100000"/>
-                  <a:shade val="100000"/>
-                  <a:hueMod val="100000"/>
-                  <a:satMod val="100000"/>
-                </a:schemeClr>
-              </a:contourClr>
-            </a:sp3d>
-          </a:bodyPr>
-          <a:lstStyle/>
-          <a:p>
-            <a:pPr algn="ctr"/>
-            <a:r>
-              <a:rPr lang="en-US" sz="4000" b="1" cap="all" dirty="0" smtClean="0">
-                <a:ln/>
-                <a:solidFill>
-                  <a:schemeClr val="bg2">
-                    <a:lumMod val="50000"/>
-                    <a:lumOff val="50000"/>
-                  </a:schemeClr>
-                </a:solidFill>
-                <a:effectLst>
-                  <a:outerShdw blurRad="19685" dist="12700" dir="5400000" algn="tl" rotWithShape="0">
-                    <a:schemeClr val="accent1">
-                      <a:satMod val="130000"/>
-                      <a:alpha val="60000"/>
-                    </a:schemeClr>
-                  </a:outerShdw>
-                  <a:reflection blurRad="10000" stA="55000" endPos="48000" dist="500" dir="5400000" sy="-100000" algn="bl" rotWithShape="0"/>
-                </a:effectLst>
-              </a:rPr>
-              <a:t>silver</a:t>
-            </a:r>
-            <a:endParaRPr lang="en-US" sz="4000" b="1" cap="all" dirty="0">
-              <a:ln/>
-              <a:solidFill>
-                <a:schemeClr val="bg2">
-                  <a:lumMod val="50000"/>
-                  <a:lumOff val="50000"/>
-                </a:schemeClr>
-              </a:solidFill>
-              <a:effectLst>
-                <a:outerShdw blurRad="19685" dist="12700" dir="5400000" algn="tl" rotWithShape="0">
-                  <a:schemeClr val="accent1">
-                    <a:satMod val="130000"/>
-                    <a:alpha val="60000"/>
-                  </a:schemeClr>
-                </a:outerShdw>
-                <a:reflection blurRad="10000" stA="55000" endPos="48000" dist="500" dir="5400000" sy="-100000" algn="bl" rotWithShape="0"/>
-              </a:effectLst>
-            </a:endParaRPr>
-          </a:p>
-        </p:txBody>
-      </p:sp>
-      <p:pic>
-        <p:nvPicPr>
-          <p:cNvPr id="29" name="Picture 4" descr="E:\Pictures\KCDC\Sponsors\advantegetech.jpg"/>
-          <p:cNvPicPr>
-            <a:picLocks noChangeAspect="1" noChangeArrowheads="1"/>
-          </p:cNvPicPr>
-          <p:nvPr/>
-        </p:nvPicPr>
-        <p:blipFill>
-          <a:blip r:embed="rId5" cstate="print">
-            <a:extLst>
-              <a:ext uri="{28A0092B-C50C-407E-A947-70E740481C1C}">
-                <a14:useLocalDpi xmlns="" xmlns:a14="http://schemas.microsoft.com/office/drawing/2010/main" val="0"/>
-              </a:ext>
-            </a:extLst>
-          </a:blip>
-          <a:srcRect/>
-          <a:stretch>
-            <a:fillRect/>
-          </a:stretch>
-        </p:blipFill>
-        <p:spPr bwMode="auto">
-          <a:xfrm>
-            <a:off x="2667000" y="4756600"/>
-            <a:ext cx="1968377" cy="676628"/>
-          </a:xfrm>
-          <a:prstGeom prst="rect">
-            <a:avLst/>
-          </a:prstGeom>
-          <a:noFill/>
-          <a:extLst>
-            <a:ext uri="{909E8E84-426E-40DD-AFC4-6F175D3DCCD1}">
-              <a14:hiddenFill xmlns="" xmlns:a14="http://schemas.microsoft.com/office/drawing/2010/main">
-                <a:solidFill>
-                  <a:srgbClr val="FFFFFF"/>
-                </a:solidFill>
-              </a14:hiddenFill>
-            </a:ext>
-          </a:extLst>
-        </p:spPr>
-      </p:pic>
-      <p:sp>
-        <p:nvSpPr>
-          <p:cNvPr id="30" name="Rectangle 29"/>
-          <p:cNvSpPr/>
-          <p:nvPr/>
-        </p:nvSpPr>
-        <p:spPr>
-          <a:xfrm>
-            <a:off x="5181600" y="4191000"/>
-            <a:ext cx="3175000" cy="461665"/>
-          </a:xfrm>
-          <a:prstGeom prst="rect">
-            <a:avLst/>
-          </a:prstGeom>
-        </p:spPr>
-        <p:txBody>
-          <a:bodyPr wrap="square">
-            <a:spAutoFit/>
-          </a:bodyPr>
-          <a:lstStyle/>
-          <a:p>
-            <a:pPr lvl="0"/>
-            <a:r>
-              <a:rPr lang="en-US" sz="2400" b="1" cap="all" dirty="0">
-                <a:ln/>
-                <a:solidFill>
-                  <a:srgbClr val="80716A">
-                    <a:lumMod val="60000"/>
-                    <a:lumOff val="40000"/>
-                  </a:srgbClr>
-                </a:solidFill>
-                <a:effectLst>
-                  <a:outerShdw blurRad="19685" dist="12700" dir="5400000" algn="tl" rotWithShape="0">
-                    <a:srgbClr val="838D9B">
-                      <a:satMod val="130000"/>
-                      <a:alpha val="60000"/>
-                    </a:srgbClr>
-                  </a:outerShdw>
-                  <a:reflection blurRad="10000" stA="55000" endPos="48000" dist="500" dir="5400000" sy="-100000" algn="bl" rotWithShape="0"/>
-                </a:effectLst>
-              </a:rPr>
-              <a:t>PRIZE SPONSORS</a:t>
-            </a:r>
-          </a:p>
-        </p:txBody>
-      </p:sp>
-      <p:pic>
-        <p:nvPicPr>
-          <p:cNvPr id="31" name="Picture 5" descr="E:\Pictures\KCDC\Sponsors\who_is_informit.png"/>
-          <p:cNvPicPr>
-            <a:picLocks noChangeAspect="1" noChangeArrowheads="1"/>
-          </p:cNvPicPr>
-          <p:nvPr/>
-        </p:nvPicPr>
-        <p:blipFill>
-          <a:blip r:embed="rId6" cstate="print">
-            <a:extLst>
-              <a:ext uri="{28A0092B-C50C-407E-A947-70E740481C1C}">
-                <a14:useLocalDpi xmlns="" xmlns:a14="http://schemas.microsoft.com/office/drawing/2010/main" val="0"/>
-              </a:ext>
-            </a:extLst>
-          </a:blip>
-          <a:srcRect/>
-          <a:stretch>
-            <a:fillRect/>
-          </a:stretch>
-        </p:blipFill>
-        <p:spPr bwMode="auto">
-          <a:xfrm>
-            <a:off x="7329366" y="4622595"/>
-            <a:ext cx="1247219" cy="1042996"/>
-          </a:xfrm>
-          <a:prstGeom prst="rect">
-            <a:avLst/>
-          </a:prstGeom>
-          <a:noFill/>
-          <a:extLst>
-            <a:ext uri="{909E8E84-426E-40DD-AFC4-6F175D3DCCD1}">
-              <a14:hiddenFill xmlns="" xmlns:a14="http://schemas.microsoft.com/office/drawing/2010/main">
-                <a:solidFill>
-                  <a:srgbClr val="FFFFFF"/>
-                </a:solidFill>
-              </a14:hiddenFill>
-            </a:ext>
-          </a:extLst>
-        </p:spPr>
-      </p:pic>
-      <p:sp>
-        <p:nvSpPr>
-          <p:cNvPr id="32" name="Rectangle 31"/>
-          <p:cNvSpPr/>
-          <p:nvPr/>
-        </p:nvSpPr>
-        <p:spPr>
-          <a:xfrm>
-            <a:off x="460429" y="76200"/>
-            <a:ext cx="3076548" cy="923330"/>
-          </a:xfrm>
-          <a:prstGeom prst="rect">
-            <a:avLst/>
-          </a:prstGeom>
-          <a:noFill/>
-        </p:spPr>
-        <p:txBody>
-          <a:bodyPr wrap="none" lIns="91440" tIns="45720" rIns="91440" bIns="45720">
-            <a:spAutoFit/>
-            <a:scene3d>
-              <a:camera prst="orthographicFront"/>
-              <a:lightRig rig="brightRoom" dir="t"/>
-            </a:scene3d>
-            <a:sp3d contourW="6350" prstMaterial="plastic">
-              <a:bevelT w="20320" h="20320" prst="angle"/>
-              <a:contourClr>
-                <a:schemeClr val="accent1">
-                  <a:tint val="100000"/>
-                  <a:shade val="100000"/>
-                  <a:hueMod val="100000"/>
-                  <a:satMod val="100000"/>
-                </a:schemeClr>
-              </a:contourClr>
-            </a:sp3d>
-          </a:bodyPr>
-          <a:lstStyle/>
-          <a:p>
-            <a:pPr algn="ctr"/>
-            <a:r>
-              <a:rPr lang="en-US" sz="5400" b="1" cap="all" spc="0" dirty="0" smtClean="0">
-                <a:ln/>
-                <a:solidFill>
-                  <a:schemeClr val="accent6">
-                    <a:lumMod val="20000"/>
-                    <a:lumOff val="80000"/>
-                  </a:schemeClr>
-                </a:solidFill>
-                <a:effectLst>
-                  <a:outerShdw blurRad="19685" dist="12700" dir="5400000" algn="tl" rotWithShape="0">
-                    <a:schemeClr val="accent1">
-                      <a:satMod val="130000"/>
-                      <a:alpha val="60000"/>
-                    </a:schemeClr>
-                  </a:outerShdw>
-                  <a:reflection blurRad="10000" stA="55000" endPos="48000" dist="500" dir="5400000" sy="-100000" algn="bl" rotWithShape="0"/>
-                </a:effectLst>
-              </a:rPr>
-              <a:t>platinum</a:t>
-            </a:r>
-            <a:endParaRPr lang="en-US" sz="5400" b="1" cap="all" spc="0" dirty="0">
-              <a:ln/>
-              <a:solidFill>
-                <a:schemeClr val="accent6">
-                  <a:lumMod val="20000"/>
-                  <a:lumOff val="80000"/>
-                </a:schemeClr>
-              </a:solidFill>
-              <a:effectLst>
-                <a:outerShdw blurRad="19685" dist="12700" dir="5400000" algn="tl" rotWithShape="0">
-                  <a:schemeClr val="accent1">
-                    <a:satMod val="130000"/>
-                    <a:alpha val="60000"/>
-                  </a:schemeClr>
-                </a:outerShdw>
-                <a:reflection blurRad="10000" stA="55000" endPos="48000" dist="500" dir="5400000" sy="-100000" algn="bl" rotWithShape="0"/>
-              </a:effectLst>
-            </a:endParaRPr>
-          </a:p>
-        </p:txBody>
-      </p:sp>
-      <p:pic>
-        <p:nvPicPr>
-          <p:cNvPr id="33" name="Picture 32"/>
-          <p:cNvPicPr>
-            <a:picLocks noChangeAspect="1"/>
-          </p:cNvPicPr>
-          <p:nvPr/>
-        </p:nvPicPr>
-        <p:blipFill>
-          <a:blip r:embed="rId7" cstate="print">
-            <a:extLst>
-              <a:ext uri="{28A0092B-C50C-407E-A947-70E740481C1C}">
-                <a14:useLocalDpi xmlns="" xmlns:a14="http://schemas.microsoft.com/office/drawing/2010/main" val="0"/>
-              </a:ext>
-            </a:extLst>
-          </a:blip>
-          <a:stretch>
-            <a:fillRect/>
-          </a:stretch>
-        </p:blipFill>
-        <p:spPr>
-          <a:xfrm>
-            <a:off x="3624430" y="252277"/>
-            <a:ext cx="2067214" cy="1933845"/>
-          </a:xfrm>
-          <a:prstGeom prst="rect">
-            <a:avLst/>
-          </a:prstGeom>
-        </p:spPr>
-      </p:pic>
-      <p:pic>
-        <p:nvPicPr>
-          <p:cNvPr id="34" name="Picture 33"/>
-          <p:cNvPicPr>
-            <a:picLocks noChangeAspect="1"/>
-          </p:cNvPicPr>
-          <p:nvPr/>
-        </p:nvPicPr>
-        <p:blipFill>
-          <a:blip r:embed="rId8" cstate="print">
-            <a:extLst>
-              <a:ext uri="{28A0092B-C50C-407E-A947-70E740481C1C}">
-                <a14:useLocalDpi xmlns="" xmlns:a14="http://schemas.microsoft.com/office/drawing/2010/main" val="0"/>
-              </a:ext>
-            </a:extLst>
-          </a:blip>
-          <a:stretch>
-            <a:fillRect/>
-          </a:stretch>
-        </p:blipFill>
-        <p:spPr>
-          <a:xfrm>
-            <a:off x="5887075" y="707206"/>
-            <a:ext cx="2653710" cy="1023985"/>
-          </a:xfrm>
-          <a:prstGeom prst="rect">
-            <a:avLst/>
-          </a:prstGeom>
-        </p:spPr>
-      </p:pic>
-      <p:pic>
-        <p:nvPicPr>
-          <p:cNvPr id="35" name="Picture 34"/>
-          <p:cNvPicPr/>
-          <p:nvPr/>
-        </p:nvPicPr>
-        <p:blipFill>
-          <a:blip r:embed="rId9" cstate="print">
-            <a:extLst>
-              <a:ext uri="{28A0092B-C50C-407E-A947-70E740481C1C}">
-                <a14:useLocalDpi xmlns="" xmlns:a14="http://schemas.microsoft.com/office/drawing/2010/main" val="0"/>
-              </a:ext>
-            </a:extLst>
-          </a:blip>
-          <a:stretch>
-            <a:fillRect/>
-          </a:stretch>
-        </p:blipFill>
-        <p:spPr>
-          <a:xfrm>
-            <a:off x="2857500" y="2497176"/>
-            <a:ext cx="2476500" cy="790575"/>
-          </a:xfrm>
-          <a:prstGeom prst="rect">
-            <a:avLst/>
-          </a:prstGeom>
-        </p:spPr>
-      </p:pic>
-      <p:pic>
-        <p:nvPicPr>
-          <p:cNvPr id="36" name="Picture 3" descr="E:\Pictures\KCDC\Sponsors\telerikLogo-web-225x90px.jpg"/>
-          <p:cNvPicPr>
-            <a:picLocks noChangeAspect="1" noChangeArrowheads="1"/>
-          </p:cNvPicPr>
-          <p:nvPr/>
-        </p:nvPicPr>
-        <p:blipFill>
-          <a:blip r:embed="rId10" cstate="print">
-            <a:extLst>
-              <a:ext uri="{28A0092B-C50C-407E-A947-70E740481C1C}">
-                <a14:useLocalDpi xmlns="" xmlns:a14="http://schemas.microsoft.com/office/drawing/2010/main" val="0"/>
-              </a:ext>
-            </a:extLst>
-          </a:blip>
-          <a:srcRect/>
-          <a:stretch>
-            <a:fillRect/>
-          </a:stretch>
-        </p:blipFill>
-        <p:spPr bwMode="auto">
-          <a:xfrm>
-            <a:off x="6210300" y="2494156"/>
-            <a:ext cx="2330485" cy="860108"/>
-          </a:xfrm>
-          <a:prstGeom prst="rect">
-            <a:avLst/>
-          </a:prstGeom>
-          <a:noFill/>
-          <a:extLst>
-            <a:ext uri="{909E8E84-426E-40DD-AFC4-6F175D3DCCD1}">
-              <a14:hiddenFill xmlns="" xmlns:a14="http://schemas.microsoft.com/office/drawing/2010/main">
-                <a:solidFill>
-                  <a:srgbClr val="FFFFFF"/>
-                </a:solidFill>
-              </a14:hiddenFill>
-            </a:ext>
-          </a:extLst>
-        </p:spPr>
-      </p:pic>
+            <a:r>
+              <a:rPr lang="en-US" dirty="0" smtClean="0"/>
+              <a:t>Questions – hold until end</a:t>
+            </a:r>
+          </a:p>
+          <a:p>
+            <a:r>
+              <a:rPr lang="en-US" dirty="0" smtClean="0"/>
+              <a:t>http://projectroundhouse.org</a:t>
+            </a:r>
+          </a:p>
+          <a:p>
+            <a:endParaRPr lang="en-US" dirty="0"/>
+          </a:p>
+        </p:txBody>
+      </p:sp>
     </p:spTree>
-    <p:extLst>
-      <p:ext uri="{BB962C8B-B14F-4D97-AF65-F5344CB8AC3E}">
-        <p14:creationId xmlns="" xmlns:p14="http://schemas.microsoft.com/office/powerpoint/2010/main" val="4248424993"/>
-      </p:ext>
-    </p:extLst>
   </p:cSld>
   <p:clrMapOvr>
     <a:masterClrMapping/>
@@ -7438,280 +7078,6 @@
 </file>
 
 <file path=ppt/slides/slide3.xml><?xml version="1.0" encoding="utf-8"?>
-<p:sld xmlns:a="http://schemas.openxmlformats.org/drawingml/2006/main" xmlns:r="http://schemas.openxmlformats.org/officeDocument/2006/relationships" xmlns:p="http://schemas.openxmlformats.org/presentationml/2006/main">
-  <p:cSld>
-    <p:spTree>
-      <p:nvGrpSpPr>
-        <p:cNvPr id="1" name=""/>
-        <p:cNvGrpSpPr/>
-        <p:nvPr/>
-      </p:nvGrpSpPr>
-      <p:grpSpPr>
-        <a:xfrm>
-          <a:off x="0" y="0"/>
-          <a:ext cx="0" cy="0"/>
-          <a:chOff x="0" y="0"/>
-          <a:chExt cx="0" cy="0"/>
-        </a:xfrm>
-      </p:grpSpPr>
-      <p:sp>
-        <p:nvSpPr>
-          <p:cNvPr id="2" name="Title 1"/>
-          <p:cNvSpPr>
-            <a:spLocks noGrp="1"/>
-          </p:cNvSpPr>
-          <p:nvPr>
-            <p:ph type="title"/>
-          </p:nvPr>
-        </p:nvSpPr>
-        <p:spPr/>
-        <p:txBody>
-          <a:bodyPr/>
-          <a:lstStyle/>
-          <a:p>
-            <a:r>
-              <a:rPr lang="en-US" dirty="0" smtClean="0"/>
-              <a:t>What will we accomplish?</a:t>
-            </a:r>
-            <a:endParaRPr lang="en-US" dirty="0"/>
-          </a:p>
-        </p:txBody>
-      </p:sp>
-      <p:sp>
-        <p:nvSpPr>
-          <p:cNvPr id="3" name="Content Placeholder 2"/>
-          <p:cNvSpPr>
-            <a:spLocks noGrp="1"/>
-          </p:cNvSpPr>
-          <p:nvPr>
-            <p:ph idx="1"/>
-          </p:nvPr>
-        </p:nvSpPr>
-        <p:spPr/>
-        <p:txBody>
-          <a:bodyPr/>
-          <a:lstStyle/>
-          <a:p>
-            <a:r>
-              <a:rPr lang="en-US" dirty="0" smtClean="0"/>
-              <a:t>All Database Scripts should be under source control</a:t>
-            </a:r>
-          </a:p>
-          <a:p>
-            <a:r>
-              <a:rPr lang="en-US" dirty="0" smtClean="0"/>
-              <a:t>A Migration Tool named RoundhousE</a:t>
-            </a:r>
-          </a:p>
-          <a:p>
-            <a:r>
-              <a:rPr lang="en-US" dirty="0" smtClean="0"/>
-              <a:t>Demos – after all this is a technical presentation right?!</a:t>
-            </a:r>
-            <a:endParaRPr lang="en-US" dirty="0"/>
-          </a:p>
-        </p:txBody>
-      </p:sp>
-    </p:spTree>
-  </p:cSld>
-  <p:clrMapOvr>
-    <a:masterClrMapping/>
-  </p:clrMapOvr>
-  <p:timing>
-    <p:tnLst>
-      <p:par>
-        <p:cTn id="1" dur="indefinite" restart="never" nodeType="tmRoot"/>
-      </p:par>
-    </p:tnLst>
-  </p:timing>
-</p:sld>
-</file>
-
-<file path=ppt/slides/slide4.xml><?xml version="1.0" encoding="utf-8"?>
-<p:sld xmlns:a="http://schemas.openxmlformats.org/drawingml/2006/main" xmlns:r="http://schemas.openxmlformats.org/officeDocument/2006/relationships" xmlns:p="http://schemas.openxmlformats.org/presentationml/2006/main">
-  <p:cSld>
-    <p:spTree>
-      <p:nvGrpSpPr>
-        <p:cNvPr id="1" name=""/>
-        <p:cNvGrpSpPr/>
-        <p:nvPr/>
-      </p:nvGrpSpPr>
-      <p:grpSpPr>
-        <a:xfrm>
-          <a:off x="0" y="0"/>
-          <a:ext cx="0" cy="0"/>
-          <a:chOff x="0" y="0"/>
-          <a:chExt cx="0" cy="0"/>
-        </a:xfrm>
-      </p:grpSpPr>
-      <p:sp>
-        <p:nvSpPr>
-          <p:cNvPr id="2" name="Title 1"/>
-          <p:cNvSpPr>
-            <a:spLocks noGrp="1"/>
-          </p:cNvSpPr>
-          <p:nvPr>
-            <p:ph type="title"/>
-          </p:nvPr>
-        </p:nvSpPr>
-        <p:spPr/>
-        <p:txBody>
-          <a:bodyPr/>
-          <a:lstStyle/>
-          <a:p>
-            <a:r>
-              <a:rPr lang="en-US" dirty="0" smtClean="0"/>
-              <a:t>Why do we need migrations?</a:t>
-            </a:r>
-            <a:endParaRPr lang="en-US" dirty="0"/>
-          </a:p>
-        </p:txBody>
-      </p:sp>
-      <p:sp>
-        <p:nvSpPr>
-          <p:cNvPr id="3" name="Content Placeholder 2"/>
-          <p:cNvSpPr>
-            <a:spLocks noGrp="1"/>
-          </p:cNvSpPr>
-          <p:nvPr>
-            <p:ph idx="1"/>
-          </p:nvPr>
-        </p:nvSpPr>
-        <p:spPr>
-          <a:xfrm>
-            <a:off x="914400" y="1371600"/>
-            <a:ext cx="7772400" cy="5105400"/>
-          </a:xfrm>
-        </p:spPr>
-        <p:txBody>
-          <a:bodyPr>
-            <a:normAutofit/>
-          </a:bodyPr>
-          <a:lstStyle/>
-          <a:p>
-            <a:r>
-              <a:rPr lang="en-US" dirty="0" smtClean="0"/>
-              <a:t>Things invariably will change</a:t>
-            </a:r>
-          </a:p>
-          <a:p>
-            <a:r>
-              <a:rPr lang="en-US" dirty="0" smtClean="0"/>
-              <a:t>Very few systems require no changes over the years</a:t>
-            </a:r>
-          </a:p>
-          <a:p>
-            <a:endParaRPr lang="en-US" dirty="0"/>
-          </a:p>
-        </p:txBody>
-      </p:sp>
-    </p:spTree>
-  </p:cSld>
-  <p:clrMapOvr>
-    <a:masterClrMapping/>
-  </p:clrMapOvr>
-  <p:timing>
-    <p:tnLst>
-      <p:par>
-        <p:cTn id="1" dur="indefinite" restart="never" nodeType="tmRoot"/>
-      </p:par>
-    </p:tnLst>
-  </p:timing>
-</p:sld>
-</file>
-
-<file path=ppt/slides/slide5.xml><?xml version="1.0" encoding="utf-8"?>
-<p:sld xmlns:a="http://schemas.openxmlformats.org/drawingml/2006/main" xmlns:r="http://schemas.openxmlformats.org/officeDocument/2006/relationships" xmlns:p="http://schemas.openxmlformats.org/presentationml/2006/main">
-  <p:cSld>
-    <p:spTree>
-      <p:nvGrpSpPr>
-        <p:cNvPr id="1" name=""/>
-        <p:cNvGrpSpPr/>
-        <p:nvPr/>
-      </p:nvGrpSpPr>
-      <p:grpSpPr>
-        <a:xfrm>
-          <a:off x="0" y="0"/>
-          <a:ext cx="0" cy="0"/>
-          <a:chOff x="0" y="0"/>
-          <a:chExt cx="0" cy="0"/>
-        </a:xfrm>
-      </p:grpSpPr>
-      <p:sp>
-        <p:nvSpPr>
-          <p:cNvPr id="2" name="Title 1"/>
-          <p:cNvSpPr>
-            <a:spLocks noGrp="1"/>
-          </p:cNvSpPr>
-          <p:nvPr>
-            <p:ph type="title"/>
-          </p:nvPr>
-        </p:nvSpPr>
-        <p:spPr/>
-        <p:txBody>
-          <a:bodyPr/>
-          <a:lstStyle/>
-          <a:p>
-            <a:r>
-              <a:rPr lang="en-US" dirty="0" smtClean="0"/>
-              <a:t>Define the Issue</a:t>
-            </a:r>
-            <a:endParaRPr lang="en-US" dirty="0"/>
-          </a:p>
-        </p:txBody>
-      </p:sp>
-      <p:sp>
-        <p:nvSpPr>
-          <p:cNvPr id="3" name="Content Placeholder 2"/>
-          <p:cNvSpPr>
-            <a:spLocks noGrp="1"/>
-          </p:cNvSpPr>
-          <p:nvPr>
-            <p:ph idx="1"/>
-          </p:nvPr>
-        </p:nvSpPr>
-        <p:spPr/>
-        <p:txBody>
-          <a:bodyPr>
-            <a:normAutofit/>
-          </a:bodyPr>
-          <a:lstStyle/>
-          <a:p>
-            <a:r>
-              <a:rPr lang="en-US" sz="3200" dirty="0" smtClean="0"/>
-              <a:t>Databases change – updates with new/changed tables, views, stored procedures, etc</a:t>
-            </a:r>
-          </a:p>
-          <a:p>
-            <a:r>
-              <a:rPr lang="en-US" sz="3200" dirty="0" smtClean="0"/>
-              <a:t>Databases store data</a:t>
-            </a:r>
-          </a:p>
-          <a:p>
-            <a:r>
-              <a:rPr lang="en-US" sz="3200" dirty="0" smtClean="0"/>
-              <a:t>Deleting data is bad. Don’t be a bad monkey!</a:t>
-            </a:r>
-          </a:p>
-        </p:txBody>
-      </p:sp>
-    </p:spTree>
-  </p:cSld>
-  <p:clrMapOvr>
-    <a:masterClrMapping/>
-  </p:clrMapOvr>
-  <p:timing>
-    <p:tnLst>
-      <p:par>
-        <p:cTn id="1" dur="indefinite" restart="never" nodeType="tmRoot"/>
-      </p:par>
-    </p:tnLst>
-  </p:timing>
-</p:sld>
-</file>
-
-<file path=ppt/slides/slide6.xml><?xml version="1.0" encoding="utf-8"?>
 <p:sld xmlns:a="http://schemas.openxmlformats.org/drawingml/2006/main" xmlns:r="http://schemas.openxmlformats.org/officeDocument/2006/relationships" xmlns:p="http://schemas.openxmlformats.org/presentationml/2006/main">
   <p:cSld>
     <p:spTree>
@@ -8803,6 +8169,304 @@
 </p:sld>
 </file>
 
+<file path=ppt/slides/slide4.xml><?xml version="1.0" encoding="utf-8"?>
+<p:sld xmlns:a="http://schemas.openxmlformats.org/drawingml/2006/main" xmlns:r="http://schemas.openxmlformats.org/officeDocument/2006/relationships" xmlns:p="http://schemas.openxmlformats.org/presentationml/2006/main">
+  <p:cSld>
+    <p:spTree>
+      <p:nvGrpSpPr>
+        <p:cNvPr id="1" name=""/>
+        <p:cNvGrpSpPr/>
+        <p:nvPr/>
+      </p:nvGrpSpPr>
+      <p:grpSpPr>
+        <a:xfrm>
+          <a:off x="0" y="0"/>
+          <a:ext cx="0" cy="0"/>
+          <a:chOff x="0" y="0"/>
+          <a:chExt cx="0" cy="0"/>
+        </a:xfrm>
+      </p:grpSpPr>
+      <p:sp>
+        <p:nvSpPr>
+          <p:cNvPr id="2" name="Title 1"/>
+          <p:cNvSpPr>
+            <a:spLocks noGrp="1"/>
+          </p:cNvSpPr>
+          <p:nvPr>
+            <p:ph type="title"/>
+          </p:nvPr>
+        </p:nvSpPr>
+        <p:spPr/>
+        <p:txBody>
+          <a:bodyPr/>
+          <a:lstStyle/>
+          <a:p>
+            <a:r>
+              <a:rPr lang="en-US" dirty="0" smtClean="0"/>
+              <a:t>Past/Present</a:t>
+            </a:r>
+            <a:endParaRPr lang="en-US" dirty="0"/>
+          </a:p>
+        </p:txBody>
+      </p:sp>
+      <p:sp>
+        <p:nvSpPr>
+          <p:cNvPr id="3" name="Content Placeholder 2"/>
+          <p:cNvSpPr>
+            <a:spLocks noGrp="1"/>
+          </p:cNvSpPr>
+          <p:nvPr>
+            <p:ph idx="1"/>
+          </p:nvPr>
+        </p:nvSpPr>
+        <p:spPr/>
+        <p:txBody>
+          <a:bodyPr/>
+          <a:lstStyle/>
+          <a:p>
+            <a:r>
+              <a:rPr lang="en-US" dirty="0" smtClean="0"/>
+              <a:t>Worked w/ a database of some </a:t>
+            </a:r>
+            <a:r>
+              <a:rPr lang="en-US" dirty="0" smtClean="0"/>
+              <a:t>sort</a:t>
+            </a:r>
+          </a:p>
+          <a:p>
+            <a:r>
+              <a:rPr lang="en-US" dirty="0" smtClean="0"/>
+              <a:t>How do you get changes?</a:t>
+            </a:r>
+            <a:endParaRPr lang="en-US" dirty="0" smtClean="0"/>
+          </a:p>
+          <a:p>
+            <a:r>
+              <a:rPr lang="en-US" dirty="0" smtClean="0"/>
+              <a:t>Does it get any easier?</a:t>
+            </a:r>
+            <a:endParaRPr lang="en-US" dirty="0"/>
+          </a:p>
+        </p:txBody>
+      </p:sp>
+    </p:spTree>
+  </p:cSld>
+  <p:clrMapOvr>
+    <a:masterClrMapping/>
+  </p:clrMapOvr>
+  <p:timing>
+    <p:tnLst>
+      <p:par>
+        <p:cTn id="1" dur="indefinite" restart="never" nodeType="tmRoot"/>
+      </p:par>
+    </p:tnLst>
+  </p:timing>
+</p:sld>
+</file>
+
+<file path=ppt/slides/slide5.xml><?xml version="1.0" encoding="utf-8"?>
+<p:sld xmlns:a="http://schemas.openxmlformats.org/drawingml/2006/main" xmlns:r="http://schemas.openxmlformats.org/officeDocument/2006/relationships" xmlns:p="http://schemas.openxmlformats.org/presentationml/2006/main">
+  <p:cSld>
+    <p:spTree>
+      <p:nvGrpSpPr>
+        <p:cNvPr id="1" name=""/>
+        <p:cNvGrpSpPr/>
+        <p:nvPr/>
+      </p:nvGrpSpPr>
+      <p:grpSpPr>
+        <a:xfrm>
+          <a:off x="0" y="0"/>
+          <a:ext cx="0" cy="0"/>
+          <a:chOff x="0" y="0"/>
+          <a:chExt cx="0" cy="0"/>
+        </a:xfrm>
+      </p:grpSpPr>
+      <p:sp>
+        <p:nvSpPr>
+          <p:cNvPr id="2" name="Title 1"/>
+          <p:cNvSpPr>
+            <a:spLocks noGrp="1"/>
+          </p:cNvSpPr>
+          <p:nvPr>
+            <p:ph type="title"/>
+          </p:nvPr>
+        </p:nvSpPr>
+        <p:spPr/>
+        <p:txBody>
+          <a:bodyPr/>
+          <a:lstStyle/>
+          <a:p>
+            <a:r>
+              <a:rPr lang="en-US" dirty="0" smtClean="0"/>
+              <a:t>Why do we need migrations?</a:t>
+            </a:r>
+            <a:endParaRPr lang="en-US" dirty="0"/>
+          </a:p>
+        </p:txBody>
+      </p:sp>
+      <p:sp>
+        <p:nvSpPr>
+          <p:cNvPr id="3" name="Content Placeholder 2"/>
+          <p:cNvSpPr>
+            <a:spLocks noGrp="1"/>
+          </p:cNvSpPr>
+          <p:nvPr>
+            <p:ph idx="1"/>
+          </p:nvPr>
+        </p:nvSpPr>
+        <p:spPr>
+          <a:xfrm>
+            <a:off x="914400" y="1371600"/>
+            <a:ext cx="7772400" cy="5105400"/>
+          </a:xfrm>
+        </p:spPr>
+        <p:txBody>
+          <a:bodyPr>
+            <a:normAutofit/>
+          </a:bodyPr>
+          <a:lstStyle/>
+          <a:p>
+            <a:r>
+              <a:rPr lang="en-US" dirty="0" smtClean="0"/>
+              <a:t>Things invariably will change</a:t>
+            </a:r>
+          </a:p>
+          <a:p>
+            <a:r>
+              <a:rPr lang="en-US" dirty="0" smtClean="0"/>
+              <a:t>Very few systems require no changes over the years</a:t>
+            </a:r>
+          </a:p>
+          <a:p>
+            <a:endParaRPr lang="en-US" dirty="0"/>
+          </a:p>
+        </p:txBody>
+      </p:sp>
+    </p:spTree>
+  </p:cSld>
+  <p:clrMapOvr>
+    <a:masterClrMapping/>
+  </p:clrMapOvr>
+  <p:timing>
+    <p:tnLst>
+      <p:par>
+        <p:cTn id="1" dur="indefinite" restart="never" nodeType="tmRoot"/>
+      </p:par>
+    </p:tnLst>
+  </p:timing>
+</p:sld>
+</file>
+
+<file path=ppt/slides/slide6.xml><?xml version="1.0" encoding="utf-8"?>
+<p:sld xmlns:a="http://schemas.openxmlformats.org/drawingml/2006/main" xmlns:r="http://schemas.openxmlformats.org/officeDocument/2006/relationships" xmlns:p="http://schemas.openxmlformats.org/presentationml/2006/main">
+  <p:cSld>
+    <p:spTree>
+      <p:nvGrpSpPr>
+        <p:cNvPr id="1" name=""/>
+        <p:cNvGrpSpPr/>
+        <p:nvPr/>
+      </p:nvGrpSpPr>
+      <p:grpSpPr>
+        <a:xfrm>
+          <a:off x="0" y="0"/>
+          <a:ext cx="0" cy="0"/>
+          <a:chOff x="0" y="0"/>
+          <a:chExt cx="0" cy="0"/>
+        </a:xfrm>
+      </p:grpSpPr>
+      <p:sp>
+        <p:nvSpPr>
+          <p:cNvPr id="2" name="Title 1"/>
+          <p:cNvSpPr>
+            <a:spLocks noGrp="1"/>
+          </p:cNvSpPr>
+          <p:nvPr>
+            <p:ph type="title"/>
+          </p:nvPr>
+        </p:nvSpPr>
+        <p:spPr/>
+        <p:txBody>
+          <a:bodyPr/>
+          <a:lstStyle/>
+          <a:p>
+            <a:r>
+              <a:rPr lang="en-US" dirty="0" smtClean="0"/>
+              <a:t>Let’s talk about Pain</a:t>
+            </a:r>
+            <a:endParaRPr lang="en-US" dirty="0"/>
+          </a:p>
+        </p:txBody>
+      </p:sp>
+      <p:sp>
+        <p:nvSpPr>
+          <p:cNvPr id="3" name="Content Placeholder 2"/>
+          <p:cNvSpPr>
+            <a:spLocks noGrp="1"/>
+          </p:cNvSpPr>
+          <p:nvPr>
+            <p:ph idx="1"/>
+          </p:nvPr>
+        </p:nvSpPr>
+        <p:spPr/>
+        <p:txBody>
+          <a:bodyPr/>
+          <a:lstStyle/>
+          <a:p>
+            <a:r>
+              <a:rPr lang="en-US" dirty="0" smtClean="0"/>
+              <a:t>How do you apply a database change one time?</a:t>
+            </a:r>
+          </a:p>
+          <a:p>
+            <a:r>
+              <a:rPr lang="en-US" dirty="0" smtClean="0"/>
+              <a:t>How do you keep all environments in sync</a:t>
+            </a:r>
+            <a:r>
+              <a:rPr lang="en-US" dirty="0" smtClean="0"/>
+              <a:t>?</a:t>
+            </a:r>
+          </a:p>
+          <a:p>
+            <a:r>
+              <a:rPr lang="en-US" sz="2800" dirty="0" smtClean="0"/>
+              <a:t>Databases change – updates with new/changed tables, views, stored procedures, etc</a:t>
+            </a:r>
+          </a:p>
+          <a:p>
+            <a:r>
+              <a:rPr lang="en-US" sz="2800" dirty="0" smtClean="0"/>
+              <a:t>Databases store data</a:t>
+            </a:r>
+          </a:p>
+          <a:p>
+            <a:r>
+              <a:rPr lang="en-US" sz="2800" dirty="0" smtClean="0"/>
+              <a:t>Deleting data is bad. Don’t be a bad monkey</a:t>
+            </a:r>
+            <a:r>
+              <a:rPr lang="en-US" sz="2800" dirty="0" smtClean="0"/>
+              <a:t>!</a:t>
+            </a:r>
+            <a:endParaRPr lang="en-US" sz="2800" dirty="0" smtClean="0"/>
+          </a:p>
+        </p:txBody>
+      </p:sp>
+    </p:spTree>
+  </p:cSld>
+  <p:clrMapOvr>
+    <a:masterClrMapping/>
+  </p:clrMapOvr>
+  <p:timing>
+    <p:tnLst>
+      <p:par>
+        <p:cTn id="1" dur="indefinite" restart="never" nodeType="tmRoot"/>
+      </p:par>
+    </p:tnLst>
+  </p:timing>
+</p:sld>
+</file>
+
 <file path=ppt/slides/slide7.xml><?xml version="1.0" encoding="utf-8"?>
 <p:sld xmlns:a="http://schemas.openxmlformats.org/drawingml/2006/main" xmlns:r="http://schemas.openxmlformats.org/officeDocument/2006/relationships" xmlns:p="http://schemas.openxmlformats.org/presentationml/2006/main">
   <p:cSld>
@@ -8837,7 +8501,7 @@
           <a:p>
             <a:r>
               <a:rPr lang="en-US" dirty="0" smtClean="0"/>
-              <a:t>Let’s talk about Pain</a:t>
+              <a:t>What is RoundhousE?</a:t>
             </a:r>
             <a:endParaRPr lang="en-US" dirty="0"/>
           </a:p>
@@ -8860,13 +8524,42 @@
           <a:p>
             <a:r>
               <a:rPr lang="en-US" dirty="0" smtClean="0"/>
-              <a:t>How do you apply a database change one time?</a:t>
-            </a:r>
-          </a:p>
-          <a:p>
+              <a:t>And why is kicking my databas</a:t>
+            </a:r>
             <a:r>
               <a:rPr lang="en-US" dirty="0" smtClean="0"/>
-              <a:t>How do you keep all environments in sync?</a:t>
+              <a:t>e a good thing?</a:t>
+            </a:r>
+          </a:p>
+          <a:p>
+            <a:r>
+              <a:rPr lang="en-US" dirty="0" smtClean="0"/>
+              <a:t>Version your database</a:t>
+            </a:r>
+          </a:p>
+          <a:p>
+            <a:r>
+              <a:rPr lang="en-US" dirty="0" smtClean="0"/>
+              <a:t>Make your auditors smile</a:t>
+            </a:r>
+          </a:p>
+          <a:p>
+            <a:r>
+              <a:rPr lang="en-US" dirty="0" smtClean="0"/>
+              <a:t>It’s environment aware</a:t>
+            </a:r>
+          </a:p>
+          <a:p>
+            <a:r>
+              <a:rPr lang="en-US" dirty="0" smtClean="0"/>
+              <a:t>It’s easy to use</a:t>
+            </a:r>
+            <a:endParaRPr lang="en-US" dirty="0" smtClean="0"/>
+          </a:p>
+          <a:p>
+            <a:r>
+              <a:rPr lang="en-US" dirty="0" smtClean="0"/>
+              <a:t>And that’s not even the cool stuff yet.</a:t>
             </a:r>
             <a:endParaRPr lang="en-US" dirty="0"/>
           </a:p>
@@ -8921,7 +8614,7 @@
           <a:p>
             <a:r>
               <a:rPr lang="en-US" dirty="0" smtClean="0"/>
-              <a:t>It’s simple</a:t>
+              <a:t>Version Your Database</a:t>
             </a:r>
             <a:endParaRPr lang="en-US" dirty="0"/>
           </a:p>
@@ -8943,12 +8636,14 @@
           <a:lstStyle/>
           <a:p>
             <a:r>
-              <a:rPr lang="en-US" smtClean="0"/>
-              <a:t>Use RoundhousE</a:t>
-            </a:r>
-            <a:r>
               <a:rPr lang="en-US" dirty="0" smtClean="0"/>
-              <a:t>!</a:t>
+              <a:t>1.0.0.0 – version?</a:t>
+            </a:r>
+          </a:p>
+          <a:p>
+            <a:r>
+              <a:rPr lang="en-US" dirty="0" smtClean="0"/>
+              <a:t>“What version is your database on?”</a:t>
             </a:r>
             <a:endParaRPr lang="en-US" dirty="0"/>
           </a:p>
@@ -8959,13 +8654,6 @@
   <p:clrMapOvr>
     <a:masterClrMapping/>
   </p:clrMapOvr>
-  <p:timing>
-    <p:tnLst>
-      <p:par>
-        <p:cTn id="1" dur="indefinite" restart="never" nodeType="tmRoot"/>
-      </p:par>
-    </p:tnLst>
-  </p:timing>
 </p:sld>
 </file>
 
@@ -9003,7 +8691,7 @@
           <a:p>
             <a:r>
               <a:rPr lang="en-US" dirty="0" smtClean="0"/>
-              <a:t>Let the demos begin</a:t>
+              <a:t>Make Your Auditors Smile</a:t>
             </a:r>
             <a:endParaRPr lang="en-US" dirty="0"/>
           </a:p>
@@ -9024,7 +8712,19 @@
           <a:bodyPr/>
           <a:lstStyle/>
           <a:p>
-            <a:endParaRPr lang="en-US"/>
+            <a:r>
+              <a:rPr lang="en-US" dirty="0" smtClean="0"/>
+              <a:t>Audit logging – who did exactly what when?</a:t>
+            </a:r>
+          </a:p>
+          <a:p>
+            <a:r>
+              <a:rPr lang="en-US" dirty="0" smtClean="0"/>
+              <a:t>Auditing changes by capturing all scripts and logs each time</a:t>
+            </a:r>
+          </a:p>
+          <a:p>
+            <a:endParaRPr lang="en-US" dirty="0"/>
           </a:p>
         </p:txBody>
       </p:sp>
@@ -9033,13 +8733,6 @@
   <p:clrMapOvr>
     <a:masterClrMapping/>
   </p:clrMapOvr>
-  <p:timing>
-    <p:tnLst>
-      <p:par>
-        <p:cTn id="1" dur="indefinite" restart="never" nodeType="tmRoot"/>
-      </p:par>
-    </p:tnLst>
-  </p:timing>
 </p:sld>
 </file>
 

</xml_diff>